<commit_message>
email address and pdf version added
</commit_message>
<xml_diff>
--- a/NEURON_tutorial.pptx
+++ b/NEURON_tutorial.pptx
@@ -268,6 +268,11 @@
       </a:defRPr>
     </a:lvl9pPr>
   </p:defaultTextStyle>
+  <p:extLst>
+    <p:ext uri="{EFAFB233-063F-42B5-8137-9DF3F51BA10A}">
+      <p15:sldGuideLst xmlns:p15="http://schemas.microsoft.com/office/powerpoint/2012/main"/>
+    </p:ext>
+  </p:extLst>
 </p:presentation>
 </file>
 
@@ -19479,8 +19484,8 @@
         </p:nvSpPr>
         <p:spPr>
           <a:xfrm>
-            <a:off x="252625" y="5409975"/>
-            <a:ext cx="3815700" cy="1448100"/>
+            <a:off x="252625" y="5149516"/>
+            <a:ext cx="5498470" cy="1708559"/>
           </a:xfrm>
           <a:prstGeom prst="rect">
             <a:avLst/>
@@ -19506,7 +19511,7 @@
               <a:buNone/>
             </a:pPr>
             <a:r>
-              <a:rPr lang="en-US" sz="1800" b="0" i="0" u="none" strike="noStrike" cap="none">
+              <a:rPr lang="en-US" sz="1800" b="0" i="0" u="none" strike="noStrike" cap="none" dirty="0">
                 <a:solidFill>
                   <a:srgbClr val="000000"/>
                 </a:solidFill>
@@ -19515,19 +19520,22 @@
                 <a:cs typeface="Century Gothic"/>
                 <a:sym typeface="Century Gothic"/>
               </a:rPr>
-              <a:t>Oren Amsalem a</a:t>
-            </a:r>
-            <a:r>
-              <a:rPr lang="en-US" sz="1800">
+              <a:t>Oren Amsalem, </a:t>
+            </a:r>
+            <a:r>
+              <a:rPr lang="en-US" sz="1800" dirty="0">
+                <a:solidFill>
+                  <a:schemeClr val="dk1"/>
+                </a:solidFill>
                 <a:latin typeface="Century Gothic"/>
                 <a:ea typeface="Century Gothic"/>
                 <a:cs typeface="Century Gothic"/>
                 <a:sym typeface="Century Gothic"/>
               </a:rPr>
-              <a:t>nd </a:t>
-            </a:r>
-            <a:r>
-              <a:rPr lang="en-US" sz="1800">
+              <a:t>Yoni </a:t>
+            </a:r>
+            <a:r>
+              <a:rPr lang="en-US" sz="1800" dirty="0" err="1">
                 <a:solidFill>
                   <a:schemeClr val="dk1"/>
                 </a:solidFill>
@@ -19536,9 +19544,21 @@
                 <a:cs typeface="Century Gothic"/>
                 <a:sym typeface="Century Gothic"/>
               </a:rPr>
-              <a:t>Yoni Leibner</a:t>
-            </a:r>
-            <a:endParaRPr/>
+              <a:t>Leibner</a:t>
+            </a:r>
+            <a:r>
+              <a:rPr lang="en-US" sz="1800" dirty="0">
+                <a:solidFill>
+                  <a:schemeClr val="dk1"/>
+                </a:solidFill>
+                <a:latin typeface="Century Gothic"/>
+                <a:ea typeface="Century Gothic"/>
+                <a:cs typeface="Century Gothic"/>
+                <a:sym typeface="Century Gothic"/>
+              </a:rPr>
+              <a:t>, and András Ecker</a:t>
+            </a:r>
+            <a:endParaRPr dirty="0"/>
           </a:p>
           <a:p>
             <a:pPr marL="0" marR="0" lvl="0" indent="0" algn="l" rtl="0">
@@ -19551,7 +19571,7 @@
               <a:buNone/>
             </a:pPr>
             <a:r>
-              <a:rPr lang="en-US" sz="1800" u="sng">
+              <a:rPr lang="en-US" sz="1800" u="sng" dirty="0">
                 <a:solidFill>
                   <a:srgbClr val="2DA0F1"/>
                 </a:solidFill>
@@ -19564,11 +19584,11 @@
               <a:t>oren.amsalem1@mail.huji.ac.il</a:t>
             </a:r>
             <a:r>
-              <a:rPr lang="en-US"/>
+              <a:rPr lang="en-US" dirty="0"/>
               <a:t>, </a:t>
             </a:r>
             <a:r>
-              <a:rPr lang="en-US" sz="1800" u="sng">
+              <a:rPr lang="en-US" sz="1800" u="sng" dirty="0">
                 <a:solidFill>
                   <a:schemeClr val="hlink"/>
                 </a:solidFill>
@@ -19580,7 +19600,15 @@
               </a:rPr>
               <a:t>yoni.leibner@mail.huji.ac.il</a:t>
             </a:r>
-            <a:endParaRPr/>
+            <a:endParaRPr lang="en-US" sz="1800" u="sng" dirty="0">
+              <a:solidFill>
+                <a:schemeClr val="hlink"/>
+              </a:solidFill>
+              <a:latin typeface="Century Gothic"/>
+              <a:ea typeface="Century Gothic"/>
+              <a:cs typeface="Century Gothic"/>
+              <a:sym typeface="Century Gothic"/>
+            </a:endParaRPr>
           </a:p>
           <a:p>
             <a:pPr marL="0" marR="0" lvl="0" indent="0" algn="l" rtl="0">
@@ -19592,7 +19620,27 @@
               </a:spcAft>
               <a:buNone/>
             </a:pPr>
-            <a:endParaRPr/>
+            <a:r>
+              <a:rPr lang="en-US" sz="1800" u="sng" dirty="0">
+                <a:solidFill>
+                  <a:schemeClr val="hlink"/>
+                </a:solidFill>
+                <a:latin typeface="Century Gothic"/>
+                <a:sym typeface="Century Gothic"/>
+                <a:hlinkClick r:id="rId6"/>
+              </a:rPr>
+              <a:t>andras.ecker@epfl.ch</a:t>
+            </a:r>
+            <a:br>
+              <a:rPr lang="en-US" sz="1800" u="sng" dirty="0">
+                <a:solidFill>
+                  <a:schemeClr val="hlink"/>
+                </a:solidFill>
+                <a:latin typeface="Century Gothic"/>
+                <a:sym typeface="Century Gothic"/>
+              </a:rPr>
+            </a:br>
+            <a:endParaRPr dirty="0"/>
           </a:p>
           <a:p>
             <a:pPr marL="0" lvl="0" indent="0" algn="l" rtl="0">
@@ -19609,7 +19657,7 @@
               <a:buNone/>
             </a:pPr>
             <a:r>
-              <a:rPr lang="en-US" sz="1800">
+              <a:rPr lang="en-US" sz="1800" dirty="0" err="1">
                 <a:solidFill>
                   <a:schemeClr val="dk1"/>
                 </a:solidFill>
@@ -19618,9 +19666,45 @@
                 <a:cs typeface="Century Gothic"/>
                 <a:sym typeface="Century Gothic"/>
               </a:rPr>
-              <a:t>Idan Segev Lab</a:t>
-            </a:r>
-            <a:endParaRPr/>
+              <a:t>Idan</a:t>
+            </a:r>
+            <a:r>
+              <a:rPr lang="en-US" sz="1800" dirty="0">
+                <a:solidFill>
+                  <a:schemeClr val="dk1"/>
+                </a:solidFill>
+                <a:latin typeface="Century Gothic"/>
+                <a:ea typeface="Century Gothic"/>
+                <a:cs typeface="Century Gothic"/>
+                <a:sym typeface="Century Gothic"/>
+              </a:rPr>
+              <a:t> </a:t>
+            </a:r>
+            <a:r>
+              <a:rPr lang="en-US" sz="1800" dirty="0" err="1">
+                <a:solidFill>
+                  <a:schemeClr val="dk1"/>
+                </a:solidFill>
+                <a:latin typeface="Century Gothic"/>
+                <a:ea typeface="Century Gothic"/>
+                <a:cs typeface="Century Gothic"/>
+                <a:sym typeface="Century Gothic"/>
+              </a:rPr>
+              <a:t>Segev</a:t>
+            </a:r>
+            <a:r>
+              <a:rPr lang="en-US" sz="1800" dirty="0">
+                <a:solidFill>
+                  <a:schemeClr val="dk1"/>
+                </a:solidFill>
+                <a:latin typeface="Century Gothic"/>
+                <a:ea typeface="Century Gothic"/>
+                <a:cs typeface="Century Gothic"/>
+                <a:sym typeface="Century Gothic"/>
+              </a:rPr>
+              <a:t> Lab and the Blue Brain Project</a:t>
+            </a:r>
+            <a:endParaRPr dirty="0"/>
           </a:p>
           <a:p>
             <a:pPr marL="0" marR="0" lvl="0" indent="0" algn="l" rtl="0">
@@ -19632,7 +19716,7 @@
               </a:spcAft>
               <a:buNone/>
             </a:pPr>
-            <a:endParaRPr/>
+            <a:endParaRPr dirty="0"/>
           </a:p>
         </p:txBody>
       </p:sp>

</xml_diff>